<commit_message>
revised cemetery ppp and excel
</commit_message>
<xml_diff>
--- a/Cemetery Project Marketing.pptx
+++ b/Cemetery Project Marketing.pptx
@@ -5,14 +5,15 @@
     <p:sldMasterId id="2147483668" r:id="rId4"/>
   </p:sldMasterIdLst>
   <p:notesMasterIdLst>
-    <p:notesMasterId r:id="rId7"/>
+    <p:notesMasterId r:id="rId8"/>
   </p:notesMasterIdLst>
   <p:handoutMasterIdLst>
-    <p:handoutMasterId r:id="rId8"/>
+    <p:handoutMasterId r:id="rId9"/>
   </p:handoutMasterIdLst>
   <p:sldIdLst>
-    <p:sldId id="321" r:id="rId5"/>
-    <p:sldId id="322" r:id="rId6"/>
+    <p:sldId id="323" r:id="rId5"/>
+    <p:sldId id="321" r:id="rId6"/>
+    <p:sldId id="322" r:id="rId7"/>
   </p:sldIdLst>
   <p:sldSz cx="7772400" cy="10058400"/>
   <p:notesSz cx="6858000" cy="9144000"/>
@@ -443,7 +444,7 @@
           <a:p>
             <a:fld id="{42C51413-530E-431E-9B96-5B986AC44B58}" type="datetimeFigureOut">
               <a:rPr lang="en-US" smtClean="0"/>
-              <a:t>5/19/2022</a:t>
+              <a:t>5/20/2022</a:t>
             </a:fld>
             <a:endParaRPr lang="en-US" dirty="0"/>
           </a:p>
@@ -8117,6 +8118,91 @@
 </file>
 
 <file path=ppt/slides/slide1.xml><?xml version="1.0" encoding="utf-8"?>
+<p:sld xmlns:a="http://schemas.openxmlformats.org/drawingml/2006/main" xmlns:r="http://schemas.openxmlformats.org/officeDocument/2006/relationships" xmlns:p="http://schemas.openxmlformats.org/presentationml/2006/main" showMasterSp="0">
+  <p:cSld>
+    <p:bg>
+      <p:bgPr>
+        <a:solidFill>
+          <a:schemeClr val="tx1"/>
+        </a:solidFill>
+        <a:effectLst/>
+      </p:bgPr>
+    </p:bg>
+    <p:spTree>
+      <p:nvGrpSpPr>
+        <p:cNvPr id="1" name=""/>
+        <p:cNvGrpSpPr/>
+        <p:nvPr/>
+      </p:nvGrpSpPr>
+      <p:grpSpPr>
+        <a:xfrm>
+          <a:off x="0" y="0"/>
+          <a:ext cx="0" cy="0"/>
+          <a:chOff x="0" y="0"/>
+          <a:chExt cx="0" cy="0"/>
+        </a:xfrm>
+      </p:grpSpPr>
+      <p:pic>
+        <p:nvPicPr>
+          <p:cNvPr id="15" name="Picture 2">
+            <a:extLst>
+              <a:ext uri="{FF2B5EF4-FFF2-40B4-BE49-F238E27FC236}">
+                <a16:creationId xmlns:a16="http://schemas.microsoft.com/office/drawing/2014/main" id="{8DD78CA7-821C-ED65-3266-3250D51465FE}"/>
+              </a:ext>
+            </a:extLst>
+          </p:cNvPr>
+          <p:cNvPicPr>
+            <a:picLocks noChangeAspect="1" noChangeArrowheads="1"/>
+          </p:cNvPicPr>
+          <p:nvPr/>
+        </p:nvPicPr>
+        <p:blipFill>
+          <a:blip r:embed="rId2">
+            <a:extLst>
+              <a:ext uri="{28A0092B-C50C-407E-A947-70E740481C1C}">
+                <a14:useLocalDpi xmlns:a14="http://schemas.microsoft.com/office/drawing/2010/main" val="0"/>
+              </a:ext>
+            </a:extLst>
+          </a:blip>
+          <a:srcRect/>
+          <a:stretch>
+            <a:fillRect/>
+          </a:stretch>
+        </p:blipFill>
+        <p:spPr bwMode="auto">
+          <a:xfrm>
+            <a:off x="1178658" y="3314224"/>
+            <a:ext cx="5641838" cy="2256735"/>
+          </a:xfrm>
+          <a:prstGeom prst="rect">
+            <a:avLst/>
+          </a:prstGeom>
+          <a:noFill/>
+          <a:extLst>
+            <a:ext uri="{909E8E84-426E-40DD-AFC4-6F175D3DCCD1}">
+              <a14:hiddenFill xmlns:a14="http://schemas.microsoft.com/office/drawing/2010/main">
+                <a:solidFill>
+                  <a:srgbClr val="FFFFFF"/>
+                </a:solidFill>
+              </a14:hiddenFill>
+            </a:ext>
+          </a:extLst>
+        </p:spPr>
+      </p:pic>
+    </p:spTree>
+    <p:extLst>
+      <p:ext uri="{BB962C8B-B14F-4D97-AF65-F5344CB8AC3E}">
+        <p14:creationId xmlns:p14="http://schemas.microsoft.com/office/powerpoint/2010/main" val="3788293792"/>
+      </p:ext>
+    </p:extLst>
+  </p:cSld>
+  <p:clrMapOvr>
+    <a:masterClrMapping/>
+  </p:clrMapOvr>
+</p:sld>
+</file>
+
+<file path=ppt/slides/slide2.xml><?xml version="1.0" encoding="utf-8"?>
 <p:sld xmlns:a="http://schemas.openxmlformats.org/drawingml/2006/main" xmlns:r="http://schemas.openxmlformats.org/officeDocument/2006/relationships" xmlns:p="http://schemas.openxmlformats.org/presentationml/2006/main">
   <p:cSld>
     <p:bg>
@@ -8192,8 +8278,8 @@
         </p:nvSpPr>
         <p:spPr>
           <a:xfrm>
-            <a:off x="215900" y="3500654"/>
-            <a:ext cx="7404100" cy="3628579"/>
+            <a:off x="215900" y="3073400"/>
+            <a:ext cx="7404100" cy="4055833"/>
           </a:xfrm>
         </p:spPr>
         <p:txBody>
@@ -8229,7 +8315,7 @@
             </a:br>
             <a:r>
               <a:rPr lang="en-US" sz="2400" dirty="0"/>
-              <a:t>Day of the Dead Picnic</a:t>
+              <a:t>DOWN WITH THE DEAD PICNIC</a:t>
             </a:r>
             <a:br>
               <a:rPr lang="en-US" sz="2400" dirty="0"/>
@@ -8303,22 +8389,7 @@
                   <a:srgbClr val="C10F92"/>
                 </a:solidFill>
               </a:rPr>
-              <a:t>Come experience Nashville history! </a:t>
-            </a:r>
-            <a:br>
-              <a:rPr lang="en-US" sz="2000" dirty="0">
-                <a:solidFill>
-                  <a:srgbClr val="C10F92"/>
-                </a:solidFill>
-              </a:rPr>
-            </a:br>
-            <a:r>
-              <a:rPr lang="en-US" sz="2000" dirty="0">
-                <a:solidFill>
-                  <a:srgbClr val="C10F92"/>
-                </a:solidFill>
-              </a:rPr>
-              <a:t>Enjoy the grounds or take a guided tour. Pack a blanket and a picnic. Food trucks will also be available on site. </a:t>
+              <a:t>Come experience a piece Nashville history. Enjoy the grounds on your own or take a guided tour. Pack a blanket and a picnic. Food trucks also available on site. </a:t>
             </a:r>
             <a:br>
               <a:rPr lang="en-US" sz="2000" dirty="0">
@@ -8335,16 +8406,24 @@
               </a:rPr>
             </a:br>
             <a:r>
-              <a:rPr lang="en-US" sz="1400" dirty="0">
+              <a:rPr lang="en-US" sz="1600" dirty="0">
                 <a:solidFill>
                   <a:schemeClr val="bg2"/>
                 </a:solidFill>
                 <a:latin typeface="Abadi Extra Light" panose="020B0204020104020204" pitchFamily="34" charset="0"/>
               </a:rPr>
-              <a:t>T-shirts available for sale with 100% proceeds benefiting the Nashville Cemetery Association. Visit our Instagram page @nashvillecitycemetery </a:t>
+              <a:t>T-shirts available for sale with 100% proceeds benefiting the Nashville Cemetery Association. </a:t>
             </a:r>
             <a:br>
-              <a:rPr lang="en-US" sz="1400" dirty="0">
+              <a:rPr lang="en-US" sz="1600" dirty="0">
+                <a:solidFill>
+                  <a:schemeClr val="bg2"/>
+                </a:solidFill>
+                <a:latin typeface="Abadi Extra Light" panose="020B0204020104020204" pitchFamily="34" charset="0"/>
+              </a:rPr>
+            </a:br>
+            <a:br>
+              <a:rPr lang="en-US" sz="1600" dirty="0">
                 <a:solidFill>
                   <a:schemeClr val="bg2"/>
                 </a:solidFill>
@@ -8352,38 +8431,13 @@
               </a:rPr>
             </a:br>
             <a:r>
-              <a:rPr lang="en-US" sz="1400" dirty="0">
+              <a:rPr lang="en-US" sz="1600" dirty="0">
                 <a:solidFill>
                   <a:schemeClr val="bg2"/>
                 </a:solidFill>
                 <a:latin typeface="Abadi Extra Light" panose="020B0204020104020204" pitchFamily="34" charset="0"/>
               </a:rPr>
-              <a:t>for more details. </a:t>
-            </a:r>
-            <a:br>
-              <a:rPr lang="en-US" sz="1400" dirty="0">
-                <a:solidFill>
-                  <a:schemeClr val="bg2"/>
-                </a:solidFill>
-                <a:latin typeface="Abadi Extra Light" panose="020B0204020104020204" pitchFamily="34" charset="0"/>
-              </a:rPr>
-            </a:br>
-            <a:br>
-              <a:rPr lang="en-US" sz="1400" dirty="0">
-                <a:solidFill>
-                  <a:schemeClr val="bg2"/>
-                </a:solidFill>
-                <a:latin typeface="Abadi Extra Light" panose="020B0204020104020204" pitchFamily="34" charset="0"/>
-              </a:rPr>
-            </a:br>
-            <a:r>
-              <a:rPr lang="en-US" sz="1400" dirty="0">
-                <a:solidFill>
-                  <a:schemeClr val="bg2"/>
-                </a:solidFill>
-                <a:latin typeface="Abadi Extra Light" panose="020B0204020104020204" pitchFamily="34" charset="0"/>
-              </a:rPr>
-              <a:t>#downwiththedead</a:t>
+              <a:t>#downwiththedeadnash</a:t>
             </a:r>
           </a:p>
         </p:txBody>
@@ -8623,6 +8677,7 @@
           <a:bodyPr/>
           <a:lstStyle/>
           <a:p>
+            <a:pPr algn="l"/>
             <a:r>
               <a:rPr lang="en-US" dirty="0">
                 <a:solidFill>
@@ -8732,6 +8787,53 @@
           </a:extLst>
         </p:spPr>
       </p:pic>
+      <p:pic>
+        <p:nvPicPr>
+          <p:cNvPr id="10" name="Picture 2">
+            <a:extLst>
+              <a:ext uri="{FF2B5EF4-FFF2-40B4-BE49-F238E27FC236}">
+                <a16:creationId xmlns:a16="http://schemas.microsoft.com/office/drawing/2014/main" id="{BBD9B237-8B61-95C7-A2EE-ED679797F6F7}"/>
+              </a:ext>
+            </a:extLst>
+          </p:cNvPr>
+          <p:cNvPicPr>
+            <a:picLocks noChangeAspect="1" noChangeArrowheads="1"/>
+          </p:cNvPicPr>
+          <p:nvPr/>
+        </p:nvPicPr>
+        <p:blipFill>
+          <a:blip r:embed="rId5">
+            <a:extLst>
+              <a:ext uri="{28A0092B-C50C-407E-A947-70E740481C1C}">
+                <a14:useLocalDpi xmlns:a14="http://schemas.microsoft.com/office/drawing/2010/main" val="0"/>
+              </a:ext>
+            </a:extLst>
+          </a:blip>
+          <a:srcRect/>
+          <a:stretch>
+            <a:fillRect/>
+          </a:stretch>
+        </p:blipFill>
+        <p:spPr bwMode="auto">
+          <a:xfrm>
+            <a:off x="5752975" y="8641055"/>
+            <a:ext cx="990725" cy="396290"/>
+          </a:xfrm>
+          <a:prstGeom prst="rect">
+            <a:avLst/>
+          </a:prstGeom>
+          <a:noFill/>
+          <a:extLst>
+            <a:ext uri="{909E8E84-426E-40DD-AFC4-6F175D3DCCD1}">
+              <a14:hiddenFill xmlns:a14="http://schemas.microsoft.com/office/drawing/2010/main">
+                <a:solidFill>
+                  <a:srgbClr val="FFFFFF"/>
+                </a:solidFill>
+              </a14:hiddenFill>
+            </a:ext>
+          </a:extLst>
+        </p:spPr>
+      </p:pic>
     </p:spTree>
     <p:extLst>
       <p:ext uri="{BB962C8B-B14F-4D97-AF65-F5344CB8AC3E}">
@@ -8745,7 +8847,7 @@
 </p:sld>
 </file>
 
-<file path=ppt/slides/slide2.xml><?xml version="1.0" encoding="utf-8"?>
+<file path=ppt/slides/slide3.xml><?xml version="1.0" encoding="utf-8"?>
 <p:sld xmlns:a="http://schemas.openxmlformats.org/drawingml/2006/main" xmlns:r="http://schemas.openxmlformats.org/officeDocument/2006/relationships" xmlns:p="http://schemas.openxmlformats.org/presentationml/2006/main">
   <p:cSld>
     <p:bg>
@@ -8788,8 +8890,8 @@
         </p:nvSpPr>
         <p:spPr>
           <a:xfrm>
-            <a:off x="914400" y="7683500"/>
-            <a:ext cx="5943600" cy="966724"/>
+            <a:off x="914400" y="8153400"/>
+            <a:ext cx="5943600" cy="496824"/>
           </a:xfrm>
         </p:spPr>
         <p:txBody>
@@ -8842,13 +8944,30 @@
         <p:spPr>
           <a:xfrm>
             <a:off x="1078303" y="4757388"/>
-            <a:ext cx="5615795" cy="2481612"/>
+            <a:ext cx="5615795" cy="2951512"/>
           </a:xfrm>
         </p:spPr>
         <p:txBody>
           <a:bodyPr/>
           <a:lstStyle/>
           <a:p>
+            <a:r>
+              <a:rPr lang="en-US" sz="6600" dirty="0">
+                <a:solidFill>
+                  <a:schemeClr val="bg1"/>
+                </a:solidFill>
+                <a:latin typeface="Bauhaus 93" panose="04030905020B02020C02" pitchFamily="82" charset="0"/>
+              </a:rPr>
+              <a:t>I GOT</a:t>
+            </a:r>
+            <a:br>
+              <a:rPr lang="en-US" sz="6600" dirty="0">
+                <a:solidFill>
+                  <a:schemeClr val="bg1"/>
+                </a:solidFill>
+                <a:latin typeface="Bauhaus 93" panose="04030905020B02020C02" pitchFamily="82" charset="0"/>
+              </a:rPr>
+            </a:br>
             <a:r>
               <a:rPr lang="en-US" sz="6600" dirty="0">
                 <a:solidFill>
@@ -8892,6 +9011,20 @@
               </a:rPr>
               <a:t>at Nashville City Cemetery</a:t>
             </a:r>
+            <a:br>
+              <a:rPr lang="en-US" sz="2400" dirty="0">
+                <a:solidFill>
+                  <a:schemeClr val="bg1"/>
+                </a:solidFill>
+                <a:latin typeface="Abadi Extra Light" panose="020B0204020104020204" pitchFamily="34" charset="0"/>
+              </a:rPr>
+            </a:br>
+            <a:endParaRPr lang="en-US" sz="2400" dirty="0">
+              <a:solidFill>
+                <a:schemeClr val="bg1"/>
+              </a:solidFill>
+              <a:latin typeface="Abadi Extra Light" panose="020B0204020104020204" pitchFamily="34" charset="0"/>
+            </a:endParaRPr>
           </a:p>
         </p:txBody>
       </p:sp>
@@ -8926,6 +9059,53 @@
           <a:prstGeom prst="rect">
             <a:avLst/>
           </a:prstGeom>
+        </p:spPr>
+      </p:pic>
+      <p:pic>
+        <p:nvPicPr>
+          <p:cNvPr id="1026" name="Picture 2">
+            <a:extLst>
+              <a:ext uri="{FF2B5EF4-FFF2-40B4-BE49-F238E27FC236}">
+                <a16:creationId xmlns:a16="http://schemas.microsoft.com/office/drawing/2014/main" id="{5440FEDA-C1DD-5F23-3B24-B1577533B0C6}"/>
+              </a:ext>
+            </a:extLst>
+          </p:cNvPr>
+          <p:cNvPicPr>
+            <a:picLocks noChangeAspect="1" noChangeArrowheads="1"/>
+          </p:cNvPicPr>
+          <p:nvPr/>
+        </p:nvPicPr>
+        <p:blipFill>
+          <a:blip r:embed="rId3">
+            <a:extLst>
+              <a:ext uri="{28A0092B-C50C-407E-A947-70E740481C1C}">
+                <a14:useLocalDpi xmlns:a14="http://schemas.microsoft.com/office/drawing/2010/main" val="0"/>
+              </a:ext>
+            </a:extLst>
+          </a:blip>
+          <a:srcRect/>
+          <a:stretch>
+            <a:fillRect/>
+          </a:stretch>
+        </p:blipFill>
+        <p:spPr bwMode="auto">
+          <a:xfrm>
+            <a:off x="2592388" y="8758507"/>
+            <a:ext cx="2333625" cy="933450"/>
+          </a:xfrm>
+          <a:prstGeom prst="rect">
+            <a:avLst/>
+          </a:prstGeom>
+          <a:noFill/>
+          <a:extLst>
+            <a:ext uri="{909E8E84-426E-40DD-AFC4-6F175D3DCCD1}">
+              <a14:hiddenFill xmlns:a14="http://schemas.microsoft.com/office/drawing/2010/main">
+                <a:solidFill>
+                  <a:srgbClr val="FFFFFF"/>
+                </a:solidFill>
+              </a14:hiddenFill>
+            </a:ext>
+          </a:extLst>
         </p:spPr>
       </p:pic>
     </p:spTree>
@@ -9733,6 +9913,24 @@
 </file>
 
 <file path=customXml/item1.xml><?xml version="1.0" encoding="utf-8"?>
+<p:properties xmlns:p="http://schemas.microsoft.com/office/2006/metadata/properties" xmlns:xsi="http://www.w3.org/2001/XMLSchema-instance" xmlns:pc="http://schemas.microsoft.com/office/infopath/2007/PartnerControls">
+  <documentManagement>
+    <Status xmlns="71af3243-3dd4-4a8d-8c0d-dd76da1f02a5">Not started</Status>
+    <MediaServiceKeyPoints xmlns="71af3243-3dd4-4a8d-8c0d-dd76da1f02a5" xsi:nil="true"/>
+  </documentManagement>
+</p:properties>
+</file>
+
+<file path=customXml/item2.xml><?xml version="1.0" encoding="utf-8"?>
+<?mso-contentType ?>
+<FormTemplates xmlns="http://schemas.microsoft.com/sharepoint/v3/contenttype/forms">
+  <Display>DocumentLibraryForm</Display>
+  <Edit>DocumentLibraryForm</Edit>
+  <New>DocumentLibraryForm</New>
+</FormTemplates>
+</file>
+
+<file path=customXml/item3.xml><?xml version="1.0" encoding="utf-8"?>
 <ct:contentTypeSchema xmlns:ct="http://schemas.microsoft.com/office/2006/metadata/contentType" xmlns:ma="http://schemas.microsoft.com/office/2006/metadata/properties/metaAttributes" ct:_="" ma:_="" ma:contentTypeName="Document" ma:contentTypeID="0x01010079F111ED35F8CC479449609E8A0923A6" ma:contentTypeVersion="12" ma:contentTypeDescription="Create a new document." ma:contentTypeScope="" ma:versionID="426e97fa315356fffbdcd9876fe988c2">
   <xsd:schema xmlns:xsd="http://www.w3.org/2001/XMLSchema" xmlns:xs="http://www.w3.org/2001/XMLSchema" xmlns:p="http://schemas.microsoft.com/office/2006/metadata/properties" xmlns:ns2="71af3243-3dd4-4a8d-8c0d-dd76da1f02a5" xmlns:ns3="16c05727-aa75-4e4a-9b5f-8a80a1165891" targetNamespace="http://schemas.microsoft.com/office/2006/metadata/properties" ma:root="true" ma:fieldsID="14b8f0def80e6d70ce3def20c90759ae" ns2:_="" ns3:_="">
     <xsd:import namespace="71af3243-3dd4-4a8d-8c0d-dd76da1f02a5"/>
@@ -9953,25 +10151,25 @@
 </ct:contentTypeSchema>
 </file>
 
-<file path=customXml/item2.xml><?xml version="1.0" encoding="utf-8"?>
-<?mso-contentType ?>
-<FormTemplates xmlns="http://schemas.microsoft.com/sharepoint/v3/contenttype/forms">
-  <Display>DocumentLibraryForm</Display>
-  <Edit>DocumentLibraryForm</Edit>
-  <New>DocumentLibraryForm</New>
-</FormTemplates>
+<file path=customXml/itemProps1.xml><?xml version="1.0" encoding="utf-8"?>
+<ds:datastoreItem xmlns:ds="http://schemas.openxmlformats.org/officeDocument/2006/customXml" ds:itemID="{5E18F198-045C-4CB0-B50B-ADBEDAB6FF8B}">
+  <ds:schemaRefs>
+    <ds:schemaRef ds:uri="http://schemas.microsoft.com/office/2006/metadata/properties"/>
+    <ds:schemaRef ds:uri="http://schemas.microsoft.com/office/infopath/2007/PartnerControls"/>
+    <ds:schemaRef ds:uri="71af3243-3dd4-4a8d-8c0d-dd76da1f02a5"/>
+  </ds:schemaRefs>
+</ds:datastoreItem>
 </file>
 
-<file path=customXml/item3.xml><?xml version="1.0" encoding="utf-8"?>
-<p:properties xmlns:p="http://schemas.microsoft.com/office/2006/metadata/properties" xmlns:xsi="http://www.w3.org/2001/XMLSchema-instance" xmlns:pc="http://schemas.microsoft.com/office/infopath/2007/PartnerControls">
-  <documentManagement>
-    <Status xmlns="71af3243-3dd4-4a8d-8c0d-dd76da1f02a5">Not started</Status>
-    <MediaServiceKeyPoints xmlns="71af3243-3dd4-4a8d-8c0d-dd76da1f02a5" xsi:nil="true"/>
-  </documentManagement>
-</p:properties>
+<file path=customXml/itemProps2.xml><?xml version="1.0" encoding="utf-8"?>
+<ds:datastoreItem xmlns:ds="http://schemas.openxmlformats.org/officeDocument/2006/customXml" ds:itemID="{63BD879F-8B49-468B-B021-67F5F8D4C429}">
+  <ds:schemaRefs>
+    <ds:schemaRef ds:uri="http://schemas.microsoft.com/sharepoint/v3/contenttype/forms"/>
+  </ds:schemaRefs>
+</ds:datastoreItem>
 </file>
 
-<file path=customXml/itemProps1.xml><?xml version="1.0" encoding="utf-8"?>
+<file path=customXml/itemProps3.xml><?xml version="1.0" encoding="utf-8"?>
 <ds:datastoreItem xmlns:ds="http://schemas.openxmlformats.org/officeDocument/2006/customXml" ds:itemID="{F9D25429-682D-4C58-A4C9-C10EA1F41795}">
   <ds:schemaRefs>
     <ds:schemaRef ds:uri="http://schemas.microsoft.com/office/2006/metadata/contentType"/>
@@ -9988,22 +10186,4 @@
     <ds:schemaRef ds:uri="http://schemas.microsoft.com/internal/obd"/>
   </ds:schemaRefs>
 </ds:datastoreItem>
-</file>
-
-<file path=customXml/itemProps2.xml><?xml version="1.0" encoding="utf-8"?>
-<ds:datastoreItem xmlns:ds="http://schemas.openxmlformats.org/officeDocument/2006/customXml" ds:itemID="{63BD879F-8B49-468B-B021-67F5F8D4C429}">
-  <ds:schemaRefs>
-    <ds:schemaRef ds:uri="http://schemas.microsoft.com/sharepoint/v3/contenttype/forms"/>
-  </ds:schemaRefs>
-</ds:datastoreItem>
-</file>
-
-<file path=customXml/itemProps3.xml><?xml version="1.0" encoding="utf-8"?>
-<ds:datastoreItem xmlns:ds="http://schemas.openxmlformats.org/officeDocument/2006/customXml" ds:itemID="{5E18F198-045C-4CB0-B50B-ADBEDAB6FF8B}">
-  <ds:schemaRefs>
-    <ds:schemaRef ds:uri="http://schemas.microsoft.com/office/2006/metadata/properties"/>
-    <ds:schemaRef ds:uri="http://schemas.microsoft.com/office/infopath/2007/PartnerControls"/>
-    <ds:schemaRef ds:uri="71af3243-3dd4-4a8d-8c0d-dd76da1f02a5"/>
-  </ds:schemaRefs>
-</ds:datastoreItem>
 </file>
</xml_diff>